<commit_message>
Protocol update (flux control)
</commit_message>
<xml_diff>
--- a/Illustrations/Pinout_2024.pptx
+++ b/Illustrations/Pinout_2024.pptx
@@ -115,7 +115,7 @@
   </p:defaultTextStyle>
   <p:extLst>
     <p:ext uri="{EFAFB233-063F-42B5-8137-9DF3F51BA10A}">
-      <p15:sldGuideLst xmlns:p15="http://schemas.microsoft.com/office/powerpoint/2012/main">
+      <p15:sldGuideLst xmlns:p15="http://schemas.microsoft.com/office/powerpoint/2012/main" xmlns="">
         <p15:guide id="1" orient="horz" pos="2160">
           <p15:clr>
             <a:srgbClr val="A4A3A4"/>
@@ -314,7 +314,7 @@
             <a:fld id="{AA309A6D-C09C-4548-B29A-6CF363A7E532}" type="datetimeFigureOut">
               <a:rPr lang="fr-FR" smtClean="0"/>
               <a:pPr/>
-              <a:t>25/03/2024</a:t>
+              <a:t>12/05/2025</a:t>
             </a:fld>
             <a:endParaRPr lang="fr-BE"/>
           </a:p>
@@ -481,7 +481,7 @@
             <a:fld id="{AA309A6D-C09C-4548-B29A-6CF363A7E532}" type="datetimeFigureOut">
               <a:rPr lang="fr-FR" smtClean="0"/>
               <a:pPr/>
-              <a:t>25/03/2024</a:t>
+              <a:t>12/05/2025</a:t>
             </a:fld>
             <a:endParaRPr lang="fr-BE"/>
           </a:p>
@@ -658,7 +658,7 @@
             <a:fld id="{AA309A6D-C09C-4548-B29A-6CF363A7E532}" type="datetimeFigureOut">
               <a:rPr lang="fr-FR" smtClean="0"/>
               <a:pPr/>
-              <a:t>25/03/2024</a:t>
+              <a:t>12/05/2025</a:t>
             </a:fld>
             <a:endParaRPr lang="fr-BE"/>
           </a:p>
@@ -825,7 +825,7 @@
             <a:fld id="{AA309A6D-C09C-4548-B29A-6CF363A7E532}" type="datetimeFigureOut">
               <a:rPr lang="fr-FR" smtClean="0"/>
               <a:pPr/>
-              <a:t>25/03/2024</a:t>
+              <a:t>12/05/2025</a:t>
             </a:fld>
             <a:endParaRPr lang="fr-BE"/>
           </a:p>
@@ -1068,7 +1068,7 @@
             <a:fld id="{AA309A6D-C09C-4548-B29A-6CF363A7E532}" type="datetimeFigureOut">
               <a:rPr lang="fr-FR" smtClean="0"/>
               <a:pPr/>
-              <a:t>25/03/2024</a:t>
+              <a:t>12/05/2025</a:t>
             </a:fld>
             <a:endParaRPr lang="fr-BE"/>
           </a:p>
@@ -1353,7 +1353,7 @@
             <a:fld id="{AA309A6D-C09C-4548-B29A-6CF363A7E532}" type="datetimeFigureOut">
               <a:rPr lang="fr-FR" smtClean="0"/>
               <a:pPr/>
-              <a:t>25/03/2024</a:t>
+              <a:t>12/05/2025</a:t>
             </a:fld>
             <a:endParaRPr lang="fr-BE"/>
           </a:p>
@@ -1772,7 +1772,7 @@
             <a:fld id="{AA309A6D-C09C-4548-B29A-6CF363A7E532}" type="datetimeFigureOut">
               <a:rPr lang="fr-FR" smtClean="0"/>
               <a:pPr/>
-              <a:t>25/03/2024</a:t>
+              <a:t>12/05/2025</a:t>
             </a:fld>
             <a:endParaRPr lang="fr-BE"/>
           </a:p>
@@ -1887,7 +1887,7 @@
             <a:fld id="{AA309A6D-C09C-4548-B29A-6CF363A7E532}" type="datetimeFigureOut">
               <a:rPr lang="fr-FR" smtClean="0"/>
               <a:pPr/>
-              <a:t>25/03/2024</a:t>
+              <a:t>12/05/2025</a:t>
             </a:fld>
             <a:endParaRPr lang="fr-BE"/>
           </a:p>
@@ -1979,7 +1979,7 @@
             <a:fld id="{AA309A6D-C09C-4548-B29A-6CF363A7E532}" type="datetimeFigureOut">
               <a:rPr lang="fr-FR" smtClean="0"/>
               <a:pPr/>
-              <a:t>25/03/2024</a:t>
+              <a:t>12/05/2025</a:t>
             </a:fld>
             <a:endParaRPr lang="fr-BE"/>
           </a:p>
@@ -2253,7 +2253,7 @@
             <a:fld id="{AA309A6D-C09C-4548-B29A-6CF363A7E532}" type="datetimeFigureOut">
               <a:rPr lang="fr-FR" smtClean="0"/>
               <a:pPr/>
-              <a:t>25/03/2024</a:t>
+              <a:t>12/05/2025</a:t>
             </a:fld>
             <a:endParaRPr lang="fr-BE"/>
           </a:p>
@@ -2503,7 +2503,7 @@
             <a:fld id="{AA309A6D-C09C-4548-B29A-6CF363A7E532}" type="datetimeFigureOut">
               <a:rPr lang="fr-FR" smtClean="0"/>
               <a:pPr/>
-              <a:t>25/03/2024</a:t>
+              <a:t>12/05/2025</a:t>
             </a:fld>
             <a:endParaRPr lang="fr-BE"/>
           </a:p>
@@ -2713,7 +2713,7 @@
             <a:fld id="{AA309A6D-C09C-4548-B29A-6CF363A7E532}" type="datetimeFigureOut">
               <a:rPr lang="fr-FR" smtClean="0"/>
               <a:pPr/>
-              <a:t>25/03/2024</a:t>
+              <a:t>12/05/2025</a:t>
             </a:fld>
             <a:endParaRPr lang="fr-BE"/>
           </a:p>
@@ -4903,7 +4903,7 @@
           <p:nvPr/>
         </p:nvPicPr>
         <p:blipFill>
-          <a:blip r:embed="rId2"/>
+          <a:blip r:embed="rId2" cstate="print"/>
           <a:stretch>
             <a:fillRect/>
           </a:stretch>
@@ -5216,7 +5216,7 @@
           <a:blip r:embed="rId5" cstate="print">
             <a:extLst>
               <a:ext uri="{28A0092B-C50C-407E-A947-70E740481C1C}">
-                <a14:useLocalDpi xmlns:a14="http://schemas.microsoft.com/office/drawing/2010/main" val="0"/>
+                <a14:useLocalDpi xmlns:a14="http://schemas.microsoft.com/office/drawing/2010/main" xmlns="" val="0"/>
               </a:ext>
             </a:extLst>
           </a:blip>
@@ -5236,7 +5236,7 @@
           <a:noFill/>
           <a:extLst>
             <a:ext uri="{909E8E84-426E-40DD-AFC4-6F175D3DCCD1}">
-              <a14:hiddenFill xmlns:a14="http://schemas.microsoft.com/office/drawing/2010/main">
+              <a14:hiddenFill xmlns:a14="http://schemas.microsoft.com/office/drawing/2010/main" xmlns="">
                 <a:solidFill>
                   <a:srgbClr val="FFFFFF"/>
                 </a:solidFill>
@@ -5288,7 +5288,7 @@
     </p:spTree>
     <p:extLst>
       <p:ext uri="{BB962C8B-B14F-4D97-AF65-F5344CB8AC3E}">
-        <p14:creationId xmlns:p14="http://schemas.microsoft.com/office/powerpoint/2010/main" val="597085793"/>
+        <p14:creationId xmlns:p14="http://schemas.microsoft.com/office/powerpoint/2010/main" xmlns="" val="597085793"/>
       </p:ext>
     </p:extLst>
   </p:cSld>
@@ -9322,15 +9322,19 @@
             </a:r>
             <a:r>
               <a:rPr lang="fr-FR" sz="1400" dirty="0" smtClean="0"/>
-              <a:t> 9 times, </a:t>
+              <a:t> </a:t>
             </a:r>
             <a:r>
               <a:rPr lang="fr-FR" sz="1400" dirty="0" err="1" smtClean="0"/>
-              <a:t>every</a:t>
+              <a:t>until</a:t>
             </a:r>
             <a:r>
               <a:rPr lang="fr-FR" sz="1400" dirty="0" smtClean="0"/>
-              <a:t> 1200 ms</a:t>
+              <a:t> not </a:t>
+            </a:r>
+            <a:r>
+              <a:rPr lang="fr-FR" sz="1400" dirty="0" err="1" smtClean="0"/>
+              <a:t>busy</a:t>
             </a:r>
             <a:endParaRPr lang="fr-FR" sz="1400" dirty="0"/>
           </a:p>
@@ -11799,7 +11803,7 @@
           <p:nvPr/>
         </p:nvPicPr>
         <p:blipFill>
-          <a:blip r:embed="rId2"/>
+          <a:blip r:embed="rId2" cstate="print"/>
           <a:stretch>
             <a:fillRect/>
           </a:stretch>
@@ -12362,7 +12366,7 @@
           <a:blip r:embed="rId7" cstate="print">
             <a:extLst>
               <a:ext uri="{28A0092B-C50C-407E-A947-70E740481C1C}">
-                <a14:useLocalDpi xmlns:a14="http://schemas.microsoft.com/office/drawing/2010/main" val="0"/>
+                <a14:useLocalDpi xmlns:a14="http://schemas.microsoft.com/office/drawing/2010/main" xmlns="" val="0"/>
               </a:ext>
             </a:extLst>
           </a:blip>
@@ -12382,7 +12386,7 @@
           <a:noFill/>
           <a:extLst>
             <a:ext uri="{909E8E84-426E-40DD-AFC4-6F175D3DCCD1}">
-              <a14:hiddenFill xmlns:a14="http://schemas.microsoft.com/office/drawing/2010/main">
+              <a14:hiddenFill xmlns:a14="http://schemas.microsoft.com/office/drawing/2010/main" xmlns="">
                 <a:solidFill>
                   <a:srgbClr val="FFFFFF"/>
                 </a:solidFill>

</xml_diff>